<commit_message>
Use hl.plot instead of bokeh plot, show ht.drop in subset variables, mention ht.n_partitions() in exploring tables
</commit_message>
<xml_diff>
--- a/hail/python/hail/docs/_static/cheatsheets/hail_tables_cheat_sheet.pptx
+++ b/hail/python/hail/docs/_static/cheatsheets/hail_tables_cheat_sheet.pptx
@@ -255,7 +255,7 @@
           <a:p>
             <a:fld id="{79278B33-2949-49BE-B3B0-3F16CAF906FE}" type="datetimeFigureOut">
               <a:rPr lang="en-US" smtClean="0"/>
-              <a:t>11/18/19</a:t>
+              <a:t>1/24/20</a:t>
             </a:fld>
             <a:endParaRPr lang="en-US" dirty="0"/>
           </a:p>
@@ -425,7 +425,7 @@
           <a:p>
             <a:fld id="{79278B33-2949-49BE-B3B0-3F16CAF906FE}" type="datetimeFigureOut">
               <a:rPr lang="en-US" smtClean="0"/>
-              <a:t>11/18/19</a:t>
+              <a:t>1/24/20</a:t>
             </a:fld>
             <a:endParaRPr lang="en-US" dirty="0"/>
           </a:p>
@@ -605,7 +605,7 @@
           <a:p>
             <a:fld id="{79278B33-2949-49BE-B3B0-3F16CAF906FE}" type="datetimeFigureOut">
               <a:rPr lang="en-US" smtClean="0"/>
-              <a:t>11/18/19</a:t>
+              <a:t>1/24/20</a:t>
             </a:fld>
             <a:endParaRPr lang="en-US" dirty="0"/>
           </a:p>
@@ -775,7 +775,7 @@
           <a:p>
             <a:fld id="{79278B33-2949-49BE-B3B0-3F16CAF906FE}" type="datetimeFigureOut">
               <a:rPr lang="en-US" smtClean="0"/>
-              <a:t>11/18/19</a:t>
+              <a:t>1/24/20</a:t>
             </a:fld>
             <a:endParaRPr lang="en-US" dirty="0"/>
           </a:p>
@@ -1019,7 +1019,7 @@
           <a:p>
             <a:fld id="{79278B33-2949-49BE-B3B0-3F16CAF906FE}" type="datetimeFigureOut">
               <a:rPr lang="en-US" smtClean="0"/>
-              <a:t>11/18/19</a:t>
+              <a:t>1/24/20</a:t>
             </a:fld>
             <a:endParaRPr lang="en-US" dirty="0"/>
           </a:p>
@@ -1251,7 +1251,7 @@
           <a:p>
             <a:fld id="{79278B33-2949-49BE-B3B0-3F16CAF906FE}" type="datetimeFigureOut">
               <a:rPr lang="en-US" smtClean="0"/>
-              <a:t>11/18/19</a:t>
+              <a:t>1/24/20</a:t>
             </a:fld>
             <a:endParaRPr lang="en-US" dirty="0"/>
           </a:p>
@@ -1618,7 +1618,7 @@
           <a:p>
             <a:fld id="{79278B33-2949-49BE-B3B0-3F16CAF906FE}" type="datetimeFigureOut">
               <a:rPr lang="en-US" smtClean="0"/>
-              <a:t>11/18/19</a:t>
+              <a:t>1/24/20</a:t>
             </a:fld>
             <a:endParaRPr lang="en-US" dirty="0"/>
           </a:p>
@@ -1736,7 +1736,7 @@
           <a:p>
             <a:fld id="{79278B33-2949-49BE-B3B0-3F16CAF906FE}" type="datetimeFigureOut">
               <a:rPr lang="en-US" smtClean="0"/>
-              <a:t>11/18/19</a:t>
+              <a:t>1/24/20</a:t>
             </a:fld>
             <a:endParaRPr lang="en-US" dirty="0"/>
           </a:p>
@@ -1831,7 +1831,7 @@
           <a:p>
             <a:fld id="{79278B33-2949-49BE-B3B0-3F16CAF906FE}" type="datetimeFigureOut">
               <a:rPr lang="en-US" smtClean="0"/>
-              <a:t>11/18/19</a:t>
+              <a:t>1/24/20</a:t>
             </a:fld>
             <a:endParaRPr lang="en-US" dirty="0"/>
           </a:p>
@@ -2108,7 +2108,7 @@
           <a:p>
             <a:fld id="{79278B33-2949-49BE-B3B0-3F16CAF906FE}" type="datetimeFigureOut">
               <a:rPr lang="en-US" smtClean="0"/>
-              <a:t>11/18/19</a:t>
+              <a:t>1/24/20</a:t>
             </a:fld>
             <a:endParaRPr lang="en-US" dirty="0"/>
           </a:p>
@@ -2364,7 +2364,7 @@
           <a:p>
             <a:fld id="{79278B33-2949-49BE-B3B0-3F16CAF906FE}" type="datetimeFigureOut">
               <a:rPr lang="en-US" smtClean="0"/>
-              <a:t>11/18/19</a:t>
+              <a:t>1/24/20</a:t>
             </a:fld>
             <a:endParaRPr lang="en-US" dirty="0"/>
           </a:p>
@@ -2577,7 +2577,7 @@
           <a:p>
             <a:fld id="{79278B33-2949-49BE-B3B0-3F16CAF906FE}" type="datetimeFigureOut">
               <a:rPr lang="en-US" smtClean="0"/>
-              <a:t>11/18/19</a:t>
+              <a:t>1/24/20</a:t>
             </a:fld>
             <a:endParaRPr lang="en-US" dirty="0"/>
           </a:p>
@@ -4657,14 +4657,14 @@
           <a:effectLst/>
           <a:extLst>
             <a:ext uri="{909E8E84-426E-40dd-AFC4-6F175D3DCCD1}">
-              <a14:hiddenFill xmlns:a14="http://schemas.microsoft.com/office/drawing/2010/main" xmlns="">
+              <a14:hiddenFill xmlns="" xmlns:a14="http://schemas.microsoft.com/office/drawing/2010/main">
                 <a:solidFill>
                   <a:schemeClr val="accent1"/>
                 </a:solidFill>
               </a14:hiddenFill>
             </a:ext>
             <a:ext uri="{91240B29-F687-4f45-9708-019B960494DF}">
-              <a14:hiddenLine xmlns:a14="http://schemas.microsoft.com/office/drawing/2010/main" xmlns="" w="9525">
+              <a14:hiddenLine xmlns="" xmlns:a14="http://schemas.microsoft.com/office/drawing/2010/main" w="9525">
                 <a:solidFill>
                   <a:schemeClr val="tx1"/>
                 </a:solidFill>
@@ -4674,7 +4674,7 @@
               </a14:hiddenLine>
             </a:ext>
             <a:ext uri="{AF507438-7753-43e0-B8FC-AC1667EBCBE1}">
-              <a14:hiddenEffects xmlns:a14="http://schemas.microsoft.com/office/drawing/2010/main" xmlns="">
+              <a14:hiddenEffects xmlns="" xmlns:a14="http://schemas.microsoft.com/office/drawing/2010/main">
                 <a:effectLst>
                   <a:outerShdw dist="35921" dir="2700000" algn="ctr" rotWithShape="0">
                     <a:schemeClr val="bg2"/>
@@ -7128,7 +7128,7 @@
         <p:spPr>
           <a:xfrm>
             <a:off x="8934980" y="6889596"/>
-            <a:ext cx="4842116" cy="1177245"/>
+            <a:ext cx="4842116" cy="1523494"/>
           </a:xfrm>
           <a:prstGeom prst="rect">
             <a:avLst/>
@@ -7212,6 +7212,58 @@
               <a:t>   Select fields whose name matches regular expression `pattern`</a:t>
             </a:r>
           </a:p>
+          <a:p>
+            <a:r>
+              <a:rPr lang="en-US" sz="1050" b="1" dirty="0" err="1">
+                <a:latin typeface="Consolas" panose="020B0609020204030204" pitchFamily="49" charset="0"/>
+                <a:cs typeface="Consolas" panose="020B0609020204030204" pitchFamily="49" charset="0"/>
+              </a:rPr>
+              <a:t>ht.drop</a:t>
+            </a:r>
+            <a:r>
+              <a:rPr lang="en-US" sz="1050" b="1" dirty="0">
+                <a:latin typeface="Consolas" panose="020B0609020204030204" pitchFamily="49" charset="0"/>
+                <a:cs typeface="Consolas" panose="020B0609020204030204" pitchFamily="49" charset="0"/>
+              </a:rPr>
+              <a:t>(*(x for x in </a:t>
+            </a:r>
+            <a:r>
+              <a:rPr lang="en-US" sz="1050" b="1" dirty="0" err="1">
+                <a:latin typeface="Consolas" panose="020B0609020204030204" pitchFamily="49" charset="0"/>
+                <a:cs typeface="Consolas" panose="020B0609020204030204" pitchFamily="49" charset="0"/>
+              </a:rPr>
+              <a:t>ht.row</a:t>
+            </a:r>
+            <a:r>
+              <a:rPr lang="en-US" sz="1050" b="1" dirty="0">
+                <a:latin typeface="Consolas" panose="020B0609020204030204" pitchFamily="49" charset="0"/>
+                <a:cs typeface="Consolas" panose="020B0609020204030204" pitchFamily="49" charset="0"/>
+              </a:rPr>
+              <a:t> if </a:t>
+            </a:r>
+            <a:r>
+              <a:rPr lang="en-US" sz="1050" b="1" dirty="0" err="1">
+                <a:latin typeface="Consolas" panose="020B0609020204030204" pitchFamily="49" charset="0"/>
+                <a:cs typeface="Consolas" panose="020B0609020204030204" pitchFamily="49" charset="0"/>
+              </a:rPr>
+              <a:t>re.match</a:t>
+            </a:r>
+            <a:r>
+              <a:rPr lang="en-US" sz="1050" b="1" dirty="0">
+                <a:latin typeface="Consolas" panose="020B0609020204030204" pitchFamily="49" charset="0"/>
+                <a:cs typeface="Consolas" panose="020B0609020204030204" pitchFamily="49" charset="0"/>
+              </a:rPr>
+              <a:t>(pattern, x))</a:t>
+            </a:r>
+          </a:p>
+          <a:p>
+            <a:r>
+              <a:rPr lang="en-US" sz="1200" dirty="0">
+                <a:cs typeface="Consolas" panose="020B0609020204030204" pitchFamily="49" charset="0"/>
+              </a:rPr>
+              <a:t>   Drop fields whose name matches regular expression `pattern`</a:t>
+            </a:r>
+          </a:p>
         </p:txBody>
       </p:sp>
       <p:graphicFrame>
@@ -7223,13 +7275,13 @@
           <p:nvPr>
             <p:extLst>
               <p:ext uri="{D42A27DB-BD31-4B8C-83A1-F6EECF244321}">
-                <p14:modId xmlns:p14="http://schemas.microsoft.com/office/powerpoint/2010/main" val="794357707"/>
+                <p14:modId xmlns:p14="http://schemas.microsoft.com/office/powerpoint/2010/main" val="393608448"/>
               </p:ext>
             </p:extLst>
           </p:nvPr>
         </p:nvGraphicFramePr>
         <p:xfrm>
-          <a:off x="8912928" y="8113897"/>
+          <a:off x="8934980" y="8548926"/>
           <a:ext cx="4939837" cy="1374905"/>
         </p:xfrm>
         <a:graphic>
@@ -10962,7 +11014,7 @@
         </p:nvSpPr>
         <p:spPr>
           <a:xfrm>
-            <a:off x="3819079" y="4160911"/>
+            <a:off x="3820034" y="4502412"/>
             <a:ext cx="3739297" cy="452403"/>
           </a:xfrm>
           <a:prstGeom prst="roundRect">
@@ -11014,8 +11066,8 @@
         </p:nvSpPr>
         <p:spPr>
           <a:xfrm>
-            <a:off x="3932515" y="4736998"/>
-            <a:ext cx="2937732" cy="1200329"/>
+            <a:off x="3904223" y="4986989"/>
+            <a:ext cx="2937732" cy="830997"/>
           </a:xfrm>
           <a:prstGeom prst="rect">
             <a:avLst/>
@@ -11057,12 +11109,6 @@
               </a:rPr>
               <a:t>Keys the table by the "year" field.</a:t>
             </a:r>
-            <a:endParaRPr lang="en-US" sz="1200" b="1" dirty="0">
-              <a:latin typeface="Consolas" panose="020B0609020204030204" pitchFamily="49" charset="0"/>
-              <a:cs typeface="Consolas" panose="020B0609020204030204" pitchFamily="49" charset="0"/>
-            </a:endParaRPr>
-          </a:p>
-          <a:p>
             <a:endParaRPr lang="en-US" sz="1200" dirty="0">
               <a:solidFill>
                 <a:schemeClr val="accent6">
@@ -11091,9 +11137,6 @@
               <a:rPr lang="en-US" sz="1200" dirty="0"/>
               <a:t>Key by with no elements unkeys the table. </a:t>
             </a:r>
-          </a:p>
-          <a:p>
-            <a:endParaRPr lang="en-US" sz="1200" dirty="0"/>
           </a:p>
         </p:txBody>
       </p:sp>
@@ -11239,7 +11282,7 @@
         <p:spPr>
           <a:xfrm>
             <a:off x="3903672" y="2536402"/>
-            <a:ext cx="3405047" cy="1569660"/>
+            <a:ext cx="3405047" cy="1938992"/>
           </a:xfrm>
           <a:prstGeom prst="rect">
             <a:avLst/>
@@ -11312,7 +11355,7 @@
           <a:p>
             <a:r>
               <a:rPr lang="en-US" sz="1200" dirty="0"/>
-              <a:t># of rows in table</a:t>
+              <a:t>   # of rows in table</a:t>
             </a:r>
           </a:p>
           <a:p>
@@ -11330,11 +11373,39 @@
             </a:r>
           </a:p>
           <a:p>
-            <a:pPr marL="111125"/>
             <a:r>
               <a:rPr lang="en-US" sz="1200" dirty="0"/>
-              <a:t>Print first n rows of table (forces computation!)</a:t>
-            </a:r>
+              <a:t>   Print first n rows of table (forces computation!)</a:t>
+            </a:r>
+            <a:r>
+              <a:rPr lang="en-US" sz="1200" b="1" dirty="0">
+                <a:latin typeface="Consolas" panose="020B0609020204030204" pitchFamily="49" charset="0"/>
+              </a:rPr>
+              <a:t> </a:t>
+            </a:r>
+            <a:r>
+              <a:rPr lang="en-US" sz="1200" b="1" dirty="0" err="1">
+                <a:latin typeface="Consolas" panose="020B0609020204030204" pitchFamily="49" charset="0"/>
+              </a:rPr>
+              <a:t>ht.n_partitions</a:t>
+            </a:r>
+            <a:r>
+              <a:rPr lang="en-US" sz="1200" b="1" dirty="0">
+                <a:latin typeface="Consolas" panose="020B0609020204030204" pitchFamily="49" charset="0"/>
+              </a:rPr>
+              <a:t>()</a:t>
+            </a:r>
+          </a:p>
+          <a:p>
+            <a:r>
+              <a:rPr lang="en-US" sz="1200" b="1" dirty="0"/>
+              <a:t>   </a:t>
+            </a:r>
+            <a:r>
+              <a:rPr lang="en-US" sz="1200" dirty="0"/>
+              <a:t>Check how many partitions your table has.</a:t>
+            </a:r>
+            <a:endParaRPr lang="en-US" sz="1200" b="1" dirty="0"/>
           </a:p>
         </p:txBody>
       </p:sp>
@@ -19020,18 +19091,18 @@
               <a:t>Hail plotting functions return a figure which can be shown with </a:t>
             </a:r>
             <a:r>
-              <a:rPr lang="en-US" sz="1200" b="1" dirty="0" err="1">
+              <a:rPr lang="en-US" sz="1200" b="1">
                 <a:latin typeface="Consolas" panose="020B0609020204030204" pitchFamily="49" charset="0"/>
                 <a:cs typeface="Consolas" panose="020B0609020204030204" pitchFamily="49" charset="0"/>
               </a:rPr>
-              <a:t>bokeh.io.show</a:t>
+              <a:t>hl.plot.show(</a:t>
             </a:r>
             <a:r>
               <a:rPr lang="en-US" sz="1200" b="1" dirty="0">
                 <a:latin typeface="Consolas" panose="020B0609020204030204" pitchFamily="49" charset="0"/>
                 <a:cs typeface="Consolas" panose="020B0609020204030204" pitchFamily="49" charset="0"/>
               </a:rPr>
-              <a:t>(fig)</a:t>
+              <a:t>fig)</a:t>
             </a:r>
           </a:p>
         </p:txBody>

</xml_diff>

<commit_message>
Second column in aggregations table, regex fix, mention aggregate in laziness section
</commit_message>
<xml_diff>
--- a/hail/python/hail/docs/_static/cheatsheets/hail_tables_cheat_sheet.pptx
+++ b/hail/python/hail/docs/_static/cheatsheets/hail_tables_cheat_sheet.pptx
@@ -255,7 +255,7 @@
           <a:p>
             <a:fld id="{79278B33-2949-49BE-B3B0-3F16CAF906FE}" type="datetimeFigureOut">
               <a:rPr lang="en-US" smtClean="0"/>
-              <a:t>1/24/20</a:t>
+              <a:t>1/27/20</a:t>
             </a:fld>
             <a:endParaRPr lang="en-US" dirty="0"/>
           </a:p>
@@ -425,7 +425,7 @@
           <a:p>
             <a:fld id="{79278B33-2949-49BE-B3B0-3F16CAF906FE}" type="datetimeFigureOut">
               <a:rPr lang="en-US" smtClean="0"/>
-              <a:t>1/24/20</a:t>
+              <a:t>1/27/20</a:t>
             </a:fld>
             <a:endParaRPr lang="en-US" dirty="0"/>
           </a:p>
@@ -605,7 +605,7 @@
           <a:p>
             <a:fld id="{79278B33-2949-49BE-B3B0-3F16CAF906FE}" type="datetimeFigureOut">
               <a:rPr lang="en-US" smtClean="0"/>
-              <a:t>1/24/20</a:t>
+              <a:t>1/27/20</a:t>
             </a:fld>
             <a:endParaRPr lang="en-US" dirty="0"/>
           </a:p>
@@ -775,7 +775,7 @@
           <a:p>
             <a:fld id="{79278B33-2949-49BE-B3B0-3F16CAF906FE}" type="datetimeFigureOut">
               <a:rPr lang="en-US" smtClean="0"/>
-              <a:t>1/24/20</a:t>
+              <a:t>1/27/20</a:t>
             </a:fld>
             <a:endParaRPr lang="en-US" dirty="0"/>
           </a:p>
@@ -1019,7 +1019,7 @@
           <a:p>
             <a:fld id="{79278B33-2949-49BE-B3B0-3F16CAF906FE}" type="datetimeFigureOut">
               <a:rPr lang="en-US" smtClean="0"/>
-              <a:t>1/24/20</a:t>
+              <a:t>1/27/20</a:t>
             </a:fld>
             <a:endParaRPr lang="en-US" dirty="0"/>
           </a:p>
@@ -1251,7 +1251,7 @@
           <a:p>
             <a:fld id="{79278B33-2949-49BE-B3B0-3F16CAF906FE}" type="datetimeFigureOut">
               <a:rPr lang="en-US" smtClean="0"/>
-              <a:t>1/24/20</a:t>
+              <a:t>1/27/20</a:t>
             </a:fld>
             <a:endParaRPr lang="en-US" dirty="0"/>
           </a:p>
@@ -1618,7 +1618,7 @@
           <a:p>
             <a:fld id="{79278B33-2949-49BE-B3B0-3F16CAF906FE}" type="datetimeFigureOut">
               <a:rPr lang="en-US" smtClean="0"/>
-              <a:t>1/24/20</a:t>
+              <a:t>1/27/20</a:t>
             </a:fld>
             <a:endParaRPr lang="en-US" dirty="0"/>
           </a:p>
@@ -1736,7 +1736,7 @@
           <a:p>
             <a:fld id="{79278B33-2949-49BE-B3B0-3F16CAF906FE}" type="datetimeFigureOut">
               <a:rPr lang="en-US" smtClean="0"/>
-              <a:t>1/24/20</a:t>
+              <a:t>1/27/20</a:t>
             </a:fld>
             <a:endParaRPr lang="en-US" dirty="0"/>
           </a:p>
@@ -1831,7 +1831,7 @@
           <a:p>
             <a:fld id="{79278B33-2949-49BE-B3B0-3F16CAF906FE}" type="datetimeFigureOut">
               <a:rPr lang="en-US" smtClean="0"/>
-              <a:t>1/24/20</a:t>
+              <a:t>1/27/20</a:t>
             </a:fld>
             <a:endParaRPr lang="en-US" dirty="0"/>
           </a:p>
@@ -2108,7 +2108,7 @@
           <a:p>
             <a:fld id="{79278B33-2949-49BE-B3B0-3F16CAF906FE}" type="datetimeFigureOut">
               <a:rPr lang="en-US" smtClean="0"/>
-              <a:t>1/24/20</a:t>
+              <a:t>1/27/20</a:t>
             </a:fld>
             <a:endParaRPr lang="en-US" dirty="0"/>
           </a:p>
@@ -2364,7 +2364,7 @@
           <a:p>
             <a:fld id="{79278B33-2949-49BE-B3B0-3F16CAF906FE}" type="datetimeFigureOut">
               <a:rPr lang="en-US" smtClean="0"/>
-              <a:t>1/24/20</a:t>
+              <a:t>1/27/20</a:t>
             </a:fld>
             <a:endParaRPr lang="en-US" dirty="0"/>
           </a:p>
@@ -2577,7 +2577,7 @@
           <a:p>
             <a:fld id="{79278B33-2949-49BE-B3B0-3F16CAF906FE}" type="datetimeFigureOut">
               <a:rPr lang="en-US" smtClean="0"/>
-              <a:t>1/24/20</a:t>
+              <a:t>1/27/20</a:t>
             </a:fld>
             <a:endParaRPr lang="en-US" dirty="0"/>
           </a:p>
@@ -4657,14 +4657,14 @@
           <a:effectLst/>
           <a:extLst>
             <a:ext uri="{909E8E84-426E-40dd-AFC4-6F175D3DCCD1}">
-              <a14:hiddenFill xmlns="" xmlns:a14="http://schemas.microsoft.com/office/drawing/2010/main">
+              <a14:hiddenFill xmlns:a14="http://schemas.microsoft.com/office/drawing/2010/main" xmlns="">
                 <a:solidFill>
                   <a:schemeClr val="accent1"/>
                 </a:solidFill>
               </a14:hiddenFill>
             </a:ext>
             <a:ext uri="{91240B29-F687-4f45-9708-019B960494DF}">
-              <a14:hiddenLine xmlns="" xmlns:a14="http://schemas.microsoft.com/office/drawing/2010/main" w="9525">
+              <a14:hiddenLine xmlns:a14="http://schemas.microsoft.com/office/drawing/2010/main" xmlns="" w="9525">
                 <a:solidFill>
                   <a:schemeClr val="tx1"/>
                 </a:solidFill>
@@ -4674,7 +4674,7 @@
               </a14:hiddenLine>
             </a:ext>
             <a:ext uri="{AF507438-7753-43e0-B8FC-AC1667EBCBE1}">
-              <a14:hiddenEffects xmlns="" xmlns:a14="http://schemas.microsoft.com/office/drawing/2010/main">
+              <a14:hiddenEffects xmlns:a14="http://schemas.microsoft.com/office/drawing/2010/main" xmlns="">
                 <a:effectLst>
                   <a:outerShdw dist="35921" dir="2700000" algn="ctr" rotWithShape="0">
                     <a:schemeClr val="bg2"/>
@@ -7275,7 +7275,7 @@
           <p:nvPr>
             <p:extLst>
               <p:ext uri="{D42A27DB-BD31-4B8C-83A1-F6EECF244321}">
-                <p14:modId xmlns:p14="http://schemas.microsoft.com/office/powerpoint/2010/main" val="393608448"/>
+                <p14:modId xmlns:p14="http://schemas.microsoft.com/office/powerpoint/2010/main" val="2485685040"/>
               </p:ext>
             </p:extLst>
           </p:nvPr>
@@ -7844,7 +7844,7 @@
                     <a:p>
                       <a:r>
                         <a:rPr lang="en-US" sz="900" dirty="0"/>
-                        <a:t>Matches strings beginning with 'x' and ending with 1,2,3,4,5</a:t>
+                        <a:t>Matches strings 'x1', 'x2', 'x3', 'x4', 'x5'.</a:t>
                       </a:r>
                     </a:p>
                   </a:txBody>
@@ -9332,7 +9332,7 @@
         <p:spPr>
           <a:xfrm>
             <a:off x="11581573" y="484461"/>
-            <a:ext cx="2316777" cy="1015663"/>
+            <a:ext cx="2316777" cy="1200329"/>
           </a:xfrm>
           <a:prstGeom prst="rect">
             <a:avLst/>
@@ -9414,6 +9414,22 @@
                 <a:cs typeface="Consolas" panose="020B0609020204030204" pitchFamily="49" charset="0"/>
               </a:rPr>
               <a:t>()</a:t>
+            </a:r>
+          </a:p>
+          <a:p>
+            <a:r>
+              <a:rPr lang="en-US" sz="1200" b="1" dirty="0" err="1">
+                <a:latin typeface="Consolas" panose="020B0609020204030204" pitchFamily="49" charset="0"/>
+                <a:cs typeface="Consolas" panose="020B0609020204030204" pitchFamily="49" charset="0"/>
+              </a:rPr>
+              <a:t>ht.aggregate</a:t>
+            </a:r>
+            <a:r>
+              <a:rPr lang="en-US" sz="1200" b="1" dirty="0">
+                <a:latin typeface="Consolas" panose="020B0609020204030204" pitchFamily="49" charset="0"/>
+                <a:cs typeface="Consolas" panose="020B0609020204030204" pitchFamily="49" charset="0"/>
+              </a:rPr>
+              <a:t>(...)</a:t>
             </a:r>
           </a:p>
         </p:txBody>
@@ -11971,7 +11987,19 @@
               <a:rPr lang="en-US" sz="1200" b="1" dirty="0">
                 <a:latin typeface="Consolas" panose="020B0609020204030204" pitchFamily="49" charset="0"/>
               </a:rPr>
-              <a:t>(hl.agg.counter(ht.a))</a:t>
+              <a:t>(hl.agg.counter(</a:t>
+            </a:r>
+            <a:r>
+              <a:rPr lang="en-US" sz="1200" b="1" dirty="0" err="1">
+                <a:latin typeface="Consolas" panose="020B0609020204030204" pitchFamily="49" charset="0"/>
+              </a:rPr>
+              <a:t>ht.b</a:t>
+            </a:r>
+            <a:r>
+              <a:rPr lang="en-US" sz="1200" b="1" dirty="0">
+                <a:latin typeface="Consolas" panose="020B0609020204030204" pitchFamily="49" charset="0"/>
+              </a:rPr>
+              <a:t>))</a:t>
             </a:r>
             <a:r>
               <a:rPr lang="en-US" sz="1200" dirty="0"/>
@@ -12000,14 +12028,14 @@
           <p:nvPr>
             <p:extLst>
               <p:ext uri="{D42A27DB-BD31-4B8C-83A1-F6EECF244321}">
-                <p14:modId xmlns:p14="http://schemas.microsoft.com/office/powerpoint/2010/main" val="1309276551"/>
+                <p14:modId xmlns:p14="http://schemas.microsoft.com/office/powerpoint/2010/main" val="846035737"/>
               </p:ext>
             </p:extLst>
           </p:nvPr>
         </p:nvGraphicFramePr>
         <p:xfrm>
           <a:off x="411494" y="1105377"/>
-          <a:ext cx="763928" cy="800100"/>
+          <a:ext cx="763927" cy="904875"/>
         </p:xfrm>
         <a:graphic>
           <a:graphicData uri="http://schemas.openxmlformats.org/drawingml/2006/table">
@@ -12016,14 +12044,21 @@
                 <a:tableStyleId>{5C22544A-7EE6-4342-B048-85BDC9FD1C3A}</a:tableStyleId>
               </a:tblPr>
               <a:tblGrid>
-                <a:gridCol w="266699">
+                <a:gridCol w="161549">
                   <a:extLst>
                     <a:ext uri="{9D8B030D-6E8A-4147-A177-3AD203B41FA5}">
                       <a16:colId xmlns:a16="http://schemas.microsoft.com/office/drawing/2014/main" val="20001"/>
                     </a:ext>
                   </a:extLst>
                 </a:gridCol>
-                <a:gridCol w="497229">
+                <a:gridCol w="301189">
+                  <a:extLst>
+                    <a:ext uri="{9D8B030D-6E8A-4147-A177-3AD203B41FA5}">
+                      <a16:colId xmlns:a16="http://schemas.microsoft.com/office/drawing/2014/main" val="1229311468"/>
+                    </a:ext>
+                  </a:extLst>
+                </a:gridCol>
+                <a:gridCol w="301189">
                   <a:extLst>
                     <a:ext uri="{9D8B030D-6E8A-4147-A177-3AD203B41FA5}">
                       <a16:colId xmlns:a16="http://schemas.microsoft.com/office/drawing/2014/main" val="20003"/>
@@ -12066,6 +12101,23 @@
                     </a:solidFill>
                   </a:tcPr>
                 </a:tc>
+                <a:tc>
+                  <a:txBody>
+                    <a:bodyPr/>
+                    <a:lstStyle/>
+                    <a:p>
+                      <a:r>
+                        <a:rPr lang="en-US" sz="1000" dirty="0"/>
+                        <a:t>  b</a:t>
+                      </a:r>
+                    </a:p>
+                  </a:txBody>
+                  <a:tcPr marL="0" marR="0" marT="0" marB="0">
+                    <a:solidFill>
+                      <a:schemeClr val="accent1"/>
+                    </a:solidFill>
+                  </a:tcPr>
+                </a:tc>
                 <a:extLst>
                   <a:ext uri="{0D108BD9-81ED-4DB2-BD59-A6C34878D82A}">
                     <a16:rowId xmlns:a16="http://schemas.microsoft.com/office/drawing/2014/main" val="10000"/>
@@ -12100,6 +12152,26 @@
                     <a:p>
                       <a:r>
                         <a:rPr lang="en-US" sz="1000" dirty="0"/>
+                        <a:t>   3.4</a:t>
+                      </a:r>
+                    </a:p>
+                  </a:txBody>
+                  <a:tcPr marL="0" marR="0" marT="0" marB="0">
+                    <a:solidFill>
+                      <a:schemeClr val="accent1">
+                        <a:lumMod val="40000"/>
+                        <a:lumOff val="60000"/>
+                      </a:schemeClr>
+                    </a:solidFill>
+                  </a:tcPr>
+                </a:tc>
+                <a:tc>
+                  <a:txBody>
+                    <a:bodyPr/>
+                    <a:lstStyle/>
+                    <a:p>
+                      <a:r>
+                        <a:rPr lang="en-US" sz="1000" dirty="0"/>
                         <a:t> "cat"</a:t>
                       </a:r>
                     </a:p>
@@ -12147,6 +12219,26 @@
                     <a:p>
                       <a:r>
                         <a:rPr lang="en-US" sz="1000" dirty="0"/>
+                        <a:t>   5.7</a:t>
+                      </a:r>
+                    </a:p>
+                  </a:txBody>
+                  <a:tcPr marL="0" marR="0" marT="0" marB="0">
+                    <a:solidFill>
+                      <a:schemeClr val="accent1">
+                        <a:lumMod val="40000"/>
+                        <a:lumOff val="60000"/>
+                      </a:schemeClr>
+                    </a:solidFill>
+                  </a:tcPr>
+                </a:tc>
+                <a:tc>
+                  <a:txBody>
+                    <a:bodyPr/>
+                    <a:lstStyle/>
+                    <a:p>
+                      <a:r>
+                        <a:rPr lang="en-US" sz="1000" dirty="0"/>
                         <a:t> "dog"</a:t>
                       </a:r>
                     </a:p>
@@ -12181,6 +12273,26 @@
                   <a:tcPr marL="0" marR="0" marT="0" marB="0">
                     <a:solidFill>
                       <a:schemeClr val="accent6">
+                        <a:lumMod val="40000"/>
+                        <a:lumOff val="60000"/>
+                      </a:schemeClr>
+                    </a:solidFill>
+                  </a:tcPr>
+                </a:tc>
+                <a:tc>
+                  <a:txBody>
+                    <a:bodyPr/>
+                    <a:lstStyle/>
+                    <a:p>
+                      <a:r>
+                        <a:rPr lang="en-US" sz="1000" dirty="0"/>
+                        <a:t>  -0.9</a:t>
+                      </a:r>
+                    </a:p>
+                  </a:txBody>
+                  <a:tcPr marL="0" marR="0" marT="0" marB="0">
+                    <a:solidFill>
+                      <a:schemeClr val="accent1">
                         <a:lumMod val="40000"/>
                         <a:lumOff val="60000"/>
                       </a:schemeClr>
@@ -12225,7 +12337,7 @@
         </p:nvSpPr>
         <p:spPr>
           <a:xfrm>
-            <a:off x="167397" y="1911623"/>
+            <a:off x="154553" y="1985992"/>
             <a:ext cx="4468432" cy="646331"/>
           </a:xfrm>
           <a:prstGeom prst="rect">
@@ -19248,7 +19360,7 @@
         </p:nvCxnSpPr>
         <p:spPr>
           <a:xfrm>
-            <a:off x="1356998" y="1472191"/>
+            <a:off x="1760784" y="1420371"/>
             <a:ext cx="610900" cy="0"/>
           </a:xfrm>
           <a:prstGeom prst="straightConnector1">
@@ -19290,7 +19402,7 @@
         </p:nvSpPr>
         <p:spPr>
           <a:xfrm>
-            <a:off x="2052762" y="1307283"/>
+            <a:off x="2437836" y="1281872"/>
             <a:ext cx="1467677" cy="276999"/>
           </a:xfrm>
           <a:prstGeom prst="rect">

</xml_diff>

<commit_message>
Table cheat sheet improvements (#7963)
* Use hl.plot instead of bokeh plot, show ht.drop in subset variables, mention ht.n_partitions() in exploring tables

* Second column in aggregations table, regex fix, mention aggregate in laziness section
</commit_message>
<xml_diff>
--- a/hail/python/hail/docs/_static/cheatsheets/hail_tables_cheat_sheet.pptx
+++ b/hail/python/hail/docs/_static/cheatsheets/hail_tables_cheat_sheet.pptx
@@ -255,7 +255,7 @@
           <a:p>
             <a:fld id="{79278B33-2949-49BE-B3B0-3F16CAF906FE}" type="datetimeFigureOut">
               <a:rPr lang="en-US" smtClean="0"/>
-              <a:t>11/18/19</a:t>
+              <a:t>1/27/20</a:t>
             </a:fld>
             <a:endParaRPr lang="en-US" dirty="0"/>
           </a:p>
@@ -425,7 +425,7 @@
           <a:p>
             <a:fld id="{79278B33-2949-49BE-B3B0-3F16CAF906FE}" type="datetimeFigureOut">
               <a:rPr lang="en-US" smtClean="0"/>
-              <a:t>11/18/19</a:t>
+              <a:t>1/27/20</a:t>
             </a:fld>
             <a:endParaRPr lang="en-US" dirty="0"/>
           </a:p>
@@ -605,7 +605,7 @@
           <a:p>
             <a:fld id="{79278B33-2949-49BE-B3B0-3F16CAF906FE}" type="datetimeFigureOut">
               <a:rPr lang="en-US" smtClean="0"/>
-              <a:t>11/18/19</a:t>
+              <a:t>1/27/20</a:t>
             </a:fld>
             <a:endParaRPr lang="en-US" dirty="0"/>
           </a:p>
@@ -775,7 +775,7 @@
           <a:p>
             <a:fld id="{79278B33-2949-49BE-B3B0-3F16CAF906FE}" type="datetimeFigureOut">
               <a:rPr lang="en-US" smtClean="0"/>
-              <a:t>11/18/19</a:t>
+              <a:t>1/27/20</a:t>
             </a:fld>
             <a:endParaRPr lang="en-US" dirty="0"/>
           </a:p>
@@ -1019,7 +1019,7 @@
           <a:p>
             <a:fld id="{79278B33-2949-49BE-B3B0-3F16CAF906FE}" type="datetimeFigureOut">
               <a:rPr lang="en-US" smtClean="0"/>
-              <a:t>11/18/19</a:t>
+              <a:t>1/27/20</a:t>
             </a:fld>
             <a:endParaRPr lang="en-US" dirty="0"/>
           </a:p>
@@ -1251,7 +1251,7 @@
           <a:p>
             <a:fld id="{79278B33-2949-49BE-B3B0-3F16CAF906FE}" type="datetimeFigureOut">
               <a:rPr lang="en-US" smtClean="0"/>
-              <a:t>11/18/19</a:t>
+              <a:t>1/27/20</a:t>
             </a:fld>
             <a:endParaRPr lang="en-US" dirty="0"/>
           </a:p>
@@ -1618,7 +1618,7 @@
           <a:p>
             <a:fld id="{79278B33-2949-49BE-B3B0-3F16CAF906FE}" type="datetimeFigureOut">
               <a:rPr lang="en-US" smtClean="0"/>
-              <a:t>11/18/19</a:t>
+              <a:t>1/27/20</a:t>
             </a:fld>
             <a:endParaRPr lang="en-US" dirty="0"/>
           </a:p>
@@ -1736,7 +1736,7 @@
           <a:p>
             <a:fld id="{79278B33-2949-49BE-B3B0-3F16CAF906FE}" type="datetimeFigureOut">
               <a:rPr lang="en-US" smtClean="0"/>
-              <a:t>11/18/19</a:t>
+              <a:t>1/27/20</a:t>
             </a:fld>
             <a:endParaRPr lang="en-US" dirty="0"/>
           </a:p>
@@ -1831,7 +1831,7 @@
           <a:p>
             <a:fld id="{79278B33-2949-49BE-B3B0-3F16CAF906FE}" type="datetimeFigureOut">
               <a:rPr lang="en-US" smtClean="0"/>
-              <a:t>11/18/19</a:t>
+              <a:t>1/27/20</a:t>
             </a:fld>
             <a:endParaRPr lang="en-US" dirty="0"/>
           </a:p>
@@ -2108,7 +2108,7 @@
           <a:p>
             <a:fld id="{79278B33-2949-49BE-B3B0-3F16CAF906FE}" type="datetimeFigureOut">
               <a:rPr lang="en-US" smtClean="0"/>
-              <a:t>11/18/19</a:t>
+              <a:t>1/27/20</a:t>
             </a:fld>
             <a:endParaRPr lang="en-US" dirty="0"/>
           </a:p>
@@ -2364,7 +2364,7 @@
           <a:p>
             <a:fld id="{79278B33-2949-49BE-B3B0-3F16CAF906FE}" type="datetimeFigureOut">
               <a:rPr lang="en-US" smtClean="0"/>
-              <a:t>11/18/19</a:t>
+              <a:t>1/27/20</a:t>
             </a:fld>
             <a:endParaRPr lang="en-US" dirty="0"/>
           </a:p>
@@ -2577,7 +2577,7 @@
           <a:p>
             <a:fld id="{79278B33-2949-49BE-B3B0-3F16CAF906FE}" type="datetimeFigureOut">
               <a:rPr lang="en-US" smtClean="0"/>
-              <a:t>11/18/19</a:t>
+              <a:t>1/27/20</a:t>
             </a:fld>
             <a:endParaRPr lang="en-US" dirty="0"/>
           </a:p>
@@ -7128,7 +7128,7 @@
         <p:spPr>
           <a:xfrm>
             <a:off x="8934980" y="6889596"/>
-            <a:ext cx="4842116" cy="1177245"/>
+            <a:ext cx="4842116" cy="1523494"/>
           </a:xfrm>
           <a:prstGeom prst="rect">
             <a:avLst/>
@@ -7212,6 +7212,58 @@
               <a:t>   Select fields whose name matches regular expression `pattern`</a:t>
             </a:r>
           </a:p>
+          <a:p>
+            <a:r>
+              <a:rPr lang="en-US" sz="1050" b="1" dirty="0" err="1">
+                <a:latin typeface="Consolas" panose="020B0609020204030204" pitchFamily="49" charset="0"/>
+                <a:cs typeface="Consolas" panose="020B0609020204030204" pitchFamily="49" charset="0"/>
+              </a:rPr>
+              <a:t>ht.drop</a:t>
+            </a:r>
+            <a:r>
+              <a:rPr lang="en-US" sz="1050" b="1" dirty="0">
+                <a:latin typeface="Consolas" panose="020B0609020204030204" pitchFamily="49" charset="0"/>
+                <a:cs typeface="Consolas" panose="020B0609020204030204" pitchFamily="49" charset="0"/>
+              </a:rPr>
+              <a:t>(*(x for x in </a:t>
+            </a:r>
+            <a:r>
+              <a:rPr lang="en-US" sz="1050" b="1" dirty="0" err="1">
+                <a:latin typeface="Consolas" panose="020B0609020204030204" pitchFamily="49" charset="0"/>
+                <a:cs typeface="Consolas" panose="020B0609020204030204" pitchFamily="49" charset="0"/>
+              </a:rPr>
+              <a:t>ht.row</a:t>
+            </a:r>
+            <a:r>
+              <a:rPr lang="en-US" sz="1050" b="1" dirty="0">
+                <a:latin typeface="Consolas" panose="020B0609020204030204" pitchFamily="49" charset="0"/>
+                <a:cs typeface="Consolas" panose="020B0609020204030204" pitchFamily="49" charset="0"/>
+              </a:rPr>
+              <a:t> if </a:t>
+            </a:r>
+            <a:r>
+              <a:rPr lang="en-US" sz="1050" b="1" dirty="0" err="1">
+                <a:latin typeface="Consolas" panose="020B0609020204030204" pitchFamily="49" charset="0"/>
+                <a:cs typeface="Consolas" panose="020B0609020204030204" pitchFamily="49" charset="0"/>
+              </a:rPr>
+              <a:t>re.match</a:t>
+            </a:r>
+            <a:r>
+              <a:rPr lang="en-US" sz="1050" b="1" dirty="0">
+                <a:latin typeface="Consolas" panose="020B0609020204030204" pitchFamily="49" charset="0"/>
+                <a:cs typeface="Consolas" panose="020B0609020204030204" pitchFamily="49" charset="0"/>
+              </a:rPr>
+              <a:t>(pattern, x))</a:t>
+            </a:r>
+          </a:p>
+          <a:p>
+            <a:r>
+              <a:rPr lang="en-US" sz="1200" dirty="0">
+                <a:cs typeface="Consolas" panose="020B0609020204030204" pitchFamily="49" charset="0"/>
+              </a:rPr>
+              <a:t>   Drop fields whose name matches regular expression `pattern`</a:t>
+            </a:r>
+          </a:p>
         </p:txBody>
       </p:sp>
       <p:graphicFrame>
@@ -7223,13 +7275,13 @@
           <p:nvPr>
             <p:extLst>
               <p:ext uri="{D42A27DB-BD31-4B8C-83A1-F6EECF244321}">
-                <p14:modId xmlns:p14="http://schemas.microsoft.com/office/powerpoint/2010/main" val="794357707"/>
+                <p14:modId xmlns:p14="http://schemas.microsoft.com/office/powerpoint/2010/main" val="2485685040"/>
               </p:ext>
             </p:extLst>
           </p:nvPr>
         </p:nvGraphicFramePr>
         <p:xfrm>
-          <a:off x="8912928" y="8113897"/>
+          <a:off x="8934980" y="8548926"/>
           <a:ext cx="4939837" cy="1374905"/>
         </p:xfrm>
         <a:graphic>
@@ -7792,7 +7844,7 @@
                     <a:p>
                       <a:r>
                         <a:rPr lang="en-US" sz="900" dirty="0"/>
-                        <a:t>Matches strings beginning with 'x' and ending with 1,2,3,4,5</a:t>
+                        <a:t>Matches strings 'x1', 'x2', 'x3', 'x4', 'x5'.</a:t>
                       </a:r>
                     </a:p>
                   </a:txBody>
@@ -9280,7 +9332,7 @@
         <p:spPr>
           <a:xfrm>
             <a:off x="11581573" y="484461"/>
-            <a:ext cx="2316777" cy="1015663"/>
+            <a:ext cx="2316777" cy="1200329"/>
           </a:xfrm>
           <a:prstGeom prst="rect">
             <a:avLst/>
@@ -9362,6 +9414,22 @@
                 <a:cs typeface="Consolas" panose="020B0609020204030204" pitchFamily="49" charset="0"/>
               </a:rPr>
               <a:t>()</a:t>
+            </a:r>
+          </a:p>
+          <a:p>
+            <a:r>
+              <a:rPr lang="en-US" sz="1200" b="1" dirty="0" err="1">
+                <a:latin typeface="Consolas" panose="020B0609020204030204" pitchFamily="49" charset="0"/>
+                <a:cs typeface="Consolas" panose="020B0609020204030204" pitchFamily="49" charset="0"/>
+              </a:rPr>
+              <a:t>ht.aggregate</a:t>
+            </a:r>
+            <a:r>
+              <a:rPr lang="en-US" sz="1200" b="1" dirty="0">
+                <a:latin typeface="Consolas" panose="020B0609020204030204" pitchFamily="49" charset="0"/>
+                <a:cs typeface="Consolas" panose="020B0609020204030204" pitchFamily="49" charset="0"/>
+              </a:rPr>
+              <a:t>(...)</a:t>
             </a:r>
           </a:p>
         </p:txBody>
@@ -10962,7 +11030,7 @@
         </p:nvSpPr>
         <p:spPr>
           <a:xfrm>
-            <a:off x="3819079" y="4160911"/>
+            <a:off x="3820034" y="4502412"/>
             <a:ext cx="3739297" cy="452403"/>
           </a:xfrm>
           <a:prstGeom prst="roundRect">
@@ -11014,8 +11082,8 @@
         </p:nvSpPr>
         <p:spPr>
           <a:xfrm>
-            <a:off x="3932515" y="4736998"/>
-            <a:ext cx="2937732" cy="1200329"/>
+            <a:off x="3904223" y="4986989"/>
+            <a:ext cx="2937732" cy="830997"/>
           </a:xfrm>
           <a:prstGeom prst="rect">
             <a:avLst/>
@@ -11057,12 +11125,6 @@
               </a:rPr>
               <a:t>Keys the table by the "year" field.</a:t>
             </a:r>
-            <a:endParaRPr lang="en-US" sz="1200" b="1" dirty="0">
-              <a:latin typeface="Consolas" panose="020B0609020204030204" pitchFamily="49" charset="0"/>
-              <a:cs typeface="Consolas" panose="020B0609020204030204" pitchFamily="49" charset="0"/>
-            </a:endParaRPr>
-          </a:p>
-          <a:p>
             <a:endParaRPr lang="en-US" sz="1200" dirty="0">
               <a:solidFill>
                 <a:schemeClr val="accent6">
@@ -11091,9 +11153,6 @@
               <a:rPr lang="en-US" sz="1200" dirty="0"/>
               <a:t>Key by with no elements unkeys the table. </a:t>
             </a:r>
-          </a:p>
-          <a:p>
-            <a:endParaRPr lang="en-US" sz="1200" dirty="0"/>
           </a:p>
         </p:txBody>
       </p:sp>
@@ -11239,7 +11298,7 @@
         <p:spPr>
           <a:xfrm>
             <a:off x="3903672" y="2536402"/>
-            <a:ext cx="3405047" cy="1569660"/>
+            <a:ext cx="3405047" cy="1938992"/>
           </a:xfrm>
           <a:prstGeom prst="rect">
             <a:avLst/>
@@ -11312,7 +11371,7 @@
           <a:p>
             <a:r>
               <a:rPr lang="en-US" sz="1200" dirty="0"/>
-              <a:t># of rows in table</a:t>
+              <a:t>   # of rows in table</a:t>
             </a:r>
           </a:p>
           <a:p>
@@ -11330,11 +11389,39 @@
             </a:r>
           </a:p>
           <a:p>
-            <a:pPr marL="111125"/>
             <a:r>
               <a:rPr lang="en-US" sz="1200" dirty="0"/>
-              <a:t>Print first n rows of table (forces computation!)</a:t>
-            </a:r>
+              <a:t>   Print first n rows of table (forces computation!)</a:t>
+            </a:r>
+            <a:r>
+              <a:rPr lang="en-US" sz="1200" b="1" dirty="0">
+                <a:latin typeface="Consolas" panose="020B0609020204030204" pitchFamily="49" charset="0"/>
+              </a:rPr>
+              <a:t> </a:t>
+            </a:r>
+            <a:r>
+              <a:rPr lang="en-US" sz="1200" b="1" dirty="0" err="1">
+                <a:latin typeface="Consolas" panose="020B0609020204030204" pitchFamily="49" charset="0"/>
+              </a:rPr>
+              <a:t>ht.n_partitions</a:t>
+            </a:r>
+            <a:r>
+              <a:rPr lang="en-US" sz="1200" b="1" dirty="0">
+                <a:latin typeface="Consolas" panose="020B0609020204030204" pitchFamily="49" charset="0"/>
+              </a:rPr>
+              <a:t>()</a:t>
+            </a:r>
+          </a:p>
+          <a:p>
+            <a:r>
+              <a:rPr lang="en-US" sz="1200" b="1" dirty="0"/>
+              <a:t>   </a:t>
+            </a:r>
+            <a:r>
+              <a:rPr lang="en-US" sz="1200" dirty="0"/>
+              <a:t>Check how many partitions your table has.</a:t>
+            </a:r>
+            <a:endParaRPr lang="en-US" sz="1200" b="1" dirty="0"/>
           </a:p>
         </p:txBody>
       </p:sp>
@@ -11900,7 +11987,19 @@
               <a:rPr lang="en-US" sz="1200" b="1" dirty="0">
                 <a:latin typeface="Consolas" panose="020B0609020204030204" pitchFamily="49" charset="0"/>
               </a:rPr>
-              <a:t>(hl.agg.counter(ht.a))</a:t>
+              <a:t>(hl.agg.counter(</a:t>
+            </a:r>
+            <a:r>
+              <a:rPr lang="en-US" sz="1200" b="1" dirty="0" err="1">
+                <a:latin typeface="Consolas" panose="020B0609020204030204" pitchFamily="49" charset="0"/>
+              </a:rPr>
+              <a:t>ht.b</a:t>
+            </a:r>
+            <a:r>
+              <a:rPr lang="en-US" sz="1200" b="1" dirty="0">
+                <a:latin typeface="Consolas" panose="020B0609020204030204" pitchFamily="49" charset="0"/>
+              </a:rPr>
+              <a:t>))</a:t>
             </a:r>
             <a:r>
               <a:rPr lang="en-US" sz="1200" dirty="0"/>
@@ -11929,14 +12028,14 @@
           <p:nvPr>
             <p:extLst>
               <p:ext uri="{D42A27DB-BD31-4B8C-83A1-F6EECF244321}">
-                <p14:modId xmlns:p14="http://schemas.microsoft.com/office/powerpoint/2010/main" val="1309276551"/>
+                <p14:modId xmlns:p14="http://schemas.microsoft.com/office/powerpoint/2010/main" val="846035737"/>
               </p:ext>
             </p:extLst>
           </p:nvPr>
         </p:nvGraphicFramePr>
         <p:xfrm>
           <a:off x="411494" y="1105377"/>
-          <a:ext cx="763928" cy="800100"/>
+          <a:ext cx="763927" cy="904875"/>
         </p:xfrm>
         <a:graphic>
           <a:graphicData uri="http://schemas.openxmlformats.org/drawingml/2006/table">
@@ -11945,14 +12044,21 @@
                 <a:tableStyleId>{5C22544A-7EE6-4342-B048-85BDC9FD1C3A}</a:tableStyleId>
               </a:tblPr>
               <a:tblGrid>
-                <a:gridCol w="266699">
+                <a:gridCol w="161549">
                   <a:extLst>
                     <a:ext uri="{9D8B030D-6E8A-4147-A177-3AD203B41FA5}">
                       <a16:colId xmlns:a16="http://schemas.microsoft.com/office/drawing/2014/main" val="20001"/>
                     </a:ext>
                   </a:extLst>
                 </a:gridCol>
-                <a:gridCol w="497229">
+                <a:gridCol w="301189">
+                  <a:extLst>
+                    <a:ext uri="{9D8B030D-6E8A-4147-A177-3AD203B41FA5}">
+                      <a16:colId xmlns:a16="http://schemas.microsoft.com/office/drawing/2014/main" val="1229311468"/>
+                    </a:ext>
+                  </a:extLst>
+                </a:gridCol>
+                <a:gridCol w="301189">
                   <a:extLst>
                     <a:ext uri="{9D8B030D-6E8A-4147-A177-3AD203B41FA5}">
                       <a16:colId xmlns:a16="http://schemas.microsoft.com/office/drawing/2014/main" val="20003"/>
@@ -11995,6 +12101,23 @@
                     </a:solidFill>
                   </a:tcPr>
                 </a:tc>
+                <a:tc>
+                  <a:txBody>
+                    <a:bodyPr/>
+                    <a:lstStyle/>
+                    <a:p>
+                      <a:r>
+                        <a:rPr lang="en-US" sz="1000" dirty="0"/>
+                        <a:t>  b</a:t>
+                      </a:r>
+                    </a:p>
+                  </a:txBody>
+                  <a:tcPr marL="0" marR="0" marT="0" marB="0">
+                    <a:solidFill>
+                      <a:schemeClr val="accent1"/>
+                    </a:solidFill>
+                  </a:tcPr>
+                </a:tc>
                 <a:extLst>
                   <a:ext uri="{0D108BD9-81ED-4DB2-BD59-A6C34878D82A}">
                     <a16:rowId xmlns:a16="http://schemas.microsoft.com/office/drawing/2014/main" val="10000"/>
@@ -12029,6 +12152,26 @@
                     <a:p>
                       <a:r>
                         <a:rPr lang="en-US" sz="1000" dirty="0"/>
+                        <a:t>   3.4</a:t>
+                      </a:r>
+                    </a:p>
+                  </a:txBody>
+                  <a:tcPr marL="0" marR="0" marT="0" marB="0">
+                    <a:solidFill>
+                      <a:schemeClr val="accent1">
+                        <a:lumMod val="40000"/>
+                        <a:lumOff val="60000"/>
+                      </a:schemeClr>
+                    </a:solidFill>
+                  </a:tcPr>
+                </a:tc>
+                <a:tc>
+                  <a:txBody>
+                    <a:bodyPr/>
+                    <a:lstStyle/>
+                    <a:p>
+                      <a:r>
+                        <a:rPr lang="en-US" sz="1000" dirty="0"/>
                         <a:t> "cat"</a:t>
                       </a:r>
                     </a:p>
@@ -12076,6 +12219,26 @@
                     <a:p>
                       <a:r>
                         <a:rPr lang="en-US" sz="1000" dirty="0"/>
+                        <a:t>   5.7</a:t>
+                      </a:r>
+                    </a:p>
+                  </a:txBody>
+                  <a:tcPr marL="0" marR="0" marT="0" marB="0">
+                    <a:solidFill>
+                      <a:schemeClr val="accent1">
+                        <a:lumMod val="40000"/>
+                        <a:lumOff val="60000"/>
+                      </a:schemeClr>
+                    </a:solidFill>
+                  </a:tcPr>
+                </a:tc>
+                <a:tc>
+                  <a:txBody>
+                    <a:bodyPr/>
+                    <a:lstStyle/>
+                    <a:p>
+                      <a:r>
+                        <a:rPr lang="en-US" sz="1000" dirty="0"/>
                         <a:t> "dog"</a:t>
                       </a:r>
                     </a:p>
@@ -12110,6 +12273,26 @@
                   <a:tcPr marL="0" marR="0" marT="0" marB="0">
                     <a:solidFill>
                       <a:schemeClr val="accent6">
+                        <a:lumMod val="40000"/>
+                        <a:lumOff val="60000"/>
+                      </a:schemeClr>
+                    </a:solidFill>
+                  </a:tcPr>
+                </a:tc>
+                <a:tc>
+                  <a:txBody>
+                    <a:bodyPr/>
+                    <a:lstStyle/>
+                    <a:p>
+                      <a:r>
+                        <a:rPr lang="en-US" sz="1000" dirty="0"/>
+                        <a:t>  -0.9</a:t>
+                      </a:r>
+                    </a:p>
+                  </a:txBody>
+                  <a:tcPr marL="0" marR="0" marT="0" marB="0">
+                    <a:solidFill>
+                      <a:schemeClr val="accent1">
                         <a:lumMod val="40000"/>
                         <a:lumOff val="60000"/>
                       </a:schemeClr>
@@ -12154,7 +12337,7 @@
         </p:nvSpPr>
         <p:spPr>
           <a:xfrm>
-            <a:off x="167397" y="1911623"/>
+            <a:off x="154553" y="1985992"/>
             <a:ext cx="4468432" cy="646331"/>
           </a:xfrm>
           <a:prstGeom prst="rect">
@@ -19020,18 +19203,18 @@
               <a:t>Hail plotting functions return a figure which can be shown with </a:t>
             </a:r>
             <a:r>
-              <a:rPr lang="en-US" sz="1200" b="1" dirty="0" err="1">
+              <a:rPr lang="en-US" sz="1200" b="1">
                 <a:latin typeface="Consolas" panose="020B0609020204030204" pitchFamily="49" charset="0"/>
                 <a:cs typeface="Consolas" panose="020B0609020204030204" pitchFamily="49" charset="0"/>
               </a:rPr>
-              <a:t>bokeh.io.show</a:t>
+              <a:t>hl.plot.show(</a:t>
             </a:r>
             <a:r>
               <a:rPr lang="en-US" sz="1200" b="1" dirty="0">
                 <a:latin typeface="Consolas" panose="020B0609020204030204" pitchFamily="49" charset="0"/>
                 <a:cs typeface="Consolas" panose="020B0609020204030204" pitchFamily="49" charset="0"/>
               </a:rPr>
-              <a:t>(fig)</a:t>
+              <a:t>fig)</a:t>
             </a:r>
           </a:p>
         </p:txBody>
@@ -19177,7 +19360,7 @@
         </p:nvCxnSpPr>
         <p:spPr>
           <a:xfrm>
-            <a:off x="1356998" y="1472191"/>
+            <a:off x="1760784" y="1420371"/>
             <a:ext cx="610900" cy="0"/>
           </a:xfrm>
           <a:prstGeom prst="straightConnector1">
@@ -19219,7 +19402,7 @@
         </p:nvSpPr>
         <p:spPr>
           <a:xfrm>
-            <a:off x="2052762" y="1307283"/>
+            <a:off x="2437836" y="1281872"/>
             <a:ext cx="1467677" cy="276999"/>
           </a:xfrm>
           <a:prstGeom prst="rect">

</xml_diff>